<commit_message>
some week 1 tweaks
</commit_message>
<xml_diff>
--- a/HelloPython/HelloPython.pptx
+++ b/HelloPython/HelloPython.pptx
@@ -214,7 +214,7 @@
           <a:p>
             <a:fld id="{19104133-B5B0-4351-8158-4F0E5EB1E2BF}" type="datetimeFigureOut">
               <a:rPr lang="en-US" smtClean="0"/>
-              <a:t>1/4/2021</a:t>
+              <a:t>1/6/2021</a:t>
             </a:fld>
             <a:endParaRPr lang="en-US"/>
           </a:p>
@@ -1286,7 +1286,7 @@
             <a:fld id="{1C2D31DE-C454-491C-B5C3-F097855E3DF7}" type="datetime4">
               <a:rPr lang="en-US" smtClean="0"/>
               <a:pPr/>
-              <a:t>January 4, 2021</a:t>
+              <a:t>January 6, 2021</a:t>
             </a:fld>
             <a:endParaRPr lang="en-US" dirty="0"/>
           </a:p>
@@ -4678,7 +4678,7 @@
           <a:p>
             <a:fld id="{5958763E-B898-436D-883D-03711491D54A}" type="datetimeFigureOut">
               <a:rPr lang="en-US" smtClean="0"/>
-              <a:t>1/4/2021</a:t>
+              <a:t>1/6/2021</a:t>
             </a:fld>
             <a:endParaRPr lang="en-US"/>
           </a:p>
@@ -4871,7 +4871,7 @@
           <a:p>
             <a:fld id="{5958763E-B898-436D-883D-03711491D54A}" type="datetimeFigureOut">
               <a:rPr lang="en-US" smtClean="0"/>
-              <a:t>1/4/2021</a:t>
+              <a:t>1/6/2021</a:t>
             </a:fld>
             <a:endParaRPr lang="en-US"/>
           </a:p>
@@ -5121,7 +5121,7 @@
           <a:p>
             <a:fld id="{5958763E-B898-436D-883D-03711491D54A}" type="datetimeFigureOut">
               <a:rPr lang="en-US" smtClean="0"/>
-              <a:t>1/4/2021</a:t>
+              <a:t>1/6/2021</a:t>
             </a:fld>
             <a:endParaRPr lang="en-US"/>
           </a:p>
@@ -5469,7 +5469,7 @@
           <a:p>
             <a:fld id="{5958763E-B898-436D-883D-03711491D54A}" type="datetimeFigureOut">
               <a:rPr lang="en-US" smtClean="0"/>
-              <a:t>1/4/2021</a:t>
+              <a:t>1/6/2021</a:t>
             </a:fld>
             <a:endParaRPr lang="en-US"/>
           </a:p>
@@ -5885,7 +5885,7 @@
           <a:p>
             <a:fld id="{5958763E-B898-436D-883D-03711491D54A}" type="datetimeFigureOut">
               <a:rPr lang="en-US" smtClean="0"/>
-              <a:t>1/4/2021</a:t>
+              <a:t>1/6/2021</a:t>
             </a:fld>
             <a:endParaRPr lang="en-US"/>
           </a:p>
@@ -6386,7 +6386,7 @@
           <a:p>
             <a:fld id="{5958763E-B898-436D-883D-03711491D54A}" type="datetimeFigureOut">
               <a:rPr lang="en-US" smtClean="0"/>
-              <a:t>1/4/2021</a:t>
+              <a:t>1/6/2021</a:t>
             </a:fld>
             <a:endParaRPr lang="en-US"/>
           </a:p>
@@ -6837,7 +6837,7 @@
           <a:p>
             <a:fld id="{5958763E-B898-436D-883D-03711491D54A}" type="datetimeFigureOut">
               <a:rPr lang="en-US" smtClean="0"/>
-              <a:t>1/4/2021</a:t>
+              <a:t>1/6/2021</a:t>
             </a:fld>
             <a:endParaRPr lang="en-US"/>
           </a:p>
@@ -7448,7 +7448,7 @@
           <a:p>
             <a:fld id="{5958763E-B898-436D-883D-03711491D54A}" type="datetimeFigureOut">
               <a:rPr lang="en-US" smtClean="0"/>
-              <a:t>1/4/2021</a:t>
+              <a:t>1/6/2021</a:t>
             </a:fld>
             <a:endParaRPr lang="en-US"/>
           </a:p>
@@ -8219,7 +8219,7 @@
           <a:p>
             <a:fld id="{5958763E-B898-436D-883D-03711491D54A}" type="datetimeFigureOut">
               <a:rPr lang="en-US" smtClean="0"/>
-              <a:t>1/4/2021</a:t>
+              <a:t>1/6/2021</a:t>
             </a:fld>
             <a:endParaRPr lang="en-US"/>
           </a:p>
@@ -8323,7 +8323,7 @@
           <a:p>
             <a:fld id="{5958763E-B898-436D-883D-03711491D54A}" type="datetimeFigureOut">
               <a:rPr lang="en-US" smtClean="0"/>
-              <a:t>1/4/2021</a:t>
+              <a:t>1/6/2021</a:t>
             </a:fld>
             <a:endParaRPr lang="en-US"/>
           </a:p>
@@ -8650,7 +8650,7 @@
             <a:fld id="{1C2D31DE-C454-491C-B5C3-F097855E3DF7}" type="datetime4">
               <a:rPr lang="en-US" smtClean="0"/>
               <a:pPr/>
-              <a:t>January 4, 2021</a:t>
+              <a:t>January 6, 2021</a:t>
             </a:fld>
             <a:endParaRPr lang="en-US" dirty="0"/>
           </a:p>
@@ -11802,7 +11802,7 @@
           <a:p>
             <a:fld id="{5958763E-B898-436D-883D-03711491D54A}" type="datetimeFigureOut">
               <a:rPr lang="en-US" smtClean="0"/>
-              <a:t>1/4/2021</a:t>
+              <a:t>1/6/2021</a:t>
             </a:fld>
             <a:endParaRPr lang="en-US"/>
           </a:p>
@@ -11926,7 +11926,7 @@
           <a:p>
             <a:fld id="{5958763E-B898-436D-883D-03711491D54A}" type="datetimeFigureOut">
               <a:rPr lang="en-US" smtClean="0"/>
-              <a:t>1/4/2021</a:t>
+              <a:t>1/6/2021</a:t>
             </a:fld>
             <a:endParaRPr lang="en-US"/>
           </a:p>
@@ -12050,7 +12050,7 @@
           <a:p>
             <a:fld id="{5958763E-B898-436D-883D-03711491D54A}" type="datetimeFigureOut">
               <a:rPr lang="en-US" smtClean="0"/>
-              <a:t>1/4/2021</a:t>
+              <a:t>1/6/2021</a:t>
             </a:fld>
             <a:endParaRPr lang="en-US"/>
           </a:p>
@@ -12174,7 +12174,7 @@
           <a:p>
             <a:fld id="{5958763E-B898-436D-883D-03711491D54A}" type="datetimeFigureOut">
               <a:rPr lang="en-US" smtClean="0"/>
-              <a:t>1/4/2021</a:t>
+              <a:t>1/6/2021</a:t>
             </a:fld>
             <a:endParaRPr lang="en-US"/>
           </a:p>
@@ -12298,7 +12298,7 @@
           <a:p>
             <a:fld id="{5958763E-B898-436D-883D-03711491D54A}" type="datetimeFigureOut">
               <a:rPr lang="en-US" smtClean="0"/>
-              <a:t>1/4/2021</a:t>
+              <a:t>1/6/2021</a:t>
             </a:fld>
             <a:endParaRPr lang="en-US"/>
           </a:p>
@@ -12422,7 +12422,7 @@
           <a:p>
             <a:fld id="{5958763E-B898-436D-883D-03711491D54A}" type="datetimeFigureOut">
               <a:rPr lang="en-US" smtClean="0"/>
-              <a:t>1/4/2021</a:t>
+              <a:t>1/6/2021</a:t>
             </a:fld>
             <a:endParaRPr lang="en-US"/>
           </a:p>
@@ -12546,7 +12546,7 @@
           <a:p>
             <a:fld id="{5958763E-B898-436D-883D-03711491D54A}" type="datetimeFigureOut">
               <a:rPr lang="en-US" smtClean="0"/>
-              <a:t>1/4/2021</a:t>
+              <a:t>1/6/2021</a:t>
             </a:fld>
             <a:endParaRPr lang="en-US"/>
           </a:p>
@@ -12670,7 +12670,7 @@
           <a:p>
             <a:fld id="{5958763E-B898-436D-883D-03711491D54A}" type="datetimeFigureOut">
               <a:rPr lang="en-US" smtClean="0"/>
-              <a:t>1/4/2021</a:t>
+              <a:t>1/6/2021</a:t>
             </a:fld>
             <a:endParaRPr lang="en-US"/>
           </a:p>
@@ -12803,7 +12803,7 @@
           <a:p>
             <a:fld id="{5958763E-B898-436D-883D-03711491D54A}" type="datetimeFigureOut">
               <a:rPr lang="en-US" smtClean="0"/>
-              <a:t>1/4/2021</a:t>
+              <a:t>1/6/2021</a:t>
             </a:fld>
             <a:endParaRPr lang="en-US"/>
           </a:p>
@@ -16142,7 +16142,7 @@
             <a:fld id="{1C2D31DE-C454-491C-B5C3-F097855E3DF7}" type="datetime4">
               <a:rPr lang="en-US" smtClean="0"/>
               <a:pPr/>
-              <a:t>January 4, 2021</a:t>
+              <a:t>January 6, 2021</a:t>
             </a:fld>
             <a:endParaRPr lang="en-US" dirty="0"/>
           </a:p>
@@ -28378,7 +28378,7 @@
           <a:p>
             <a:fld id="{5958763E-B898-436D-883D-03711491D54A}" type="datetimeFigureOut">
               <a:rPr lang="en-US" smtClean="0"/>
-              <a:t>1/4/2021</a:t>
+              <a:t>1/6/2021</a:t>
             </a:fld>
             <a:endParaRPr lang="en-US"/>
           </a:p>
@@ -28780,7 +28780,7 @@
           <a:p>
             <a:fld id="{5958763E-B898-436D-883D-03711491D54A}" type="datetimeFigureOut">
               <a:rPr lang="en-US" smtClean="0"/>
-              <a:t>1/4/2021</a:t>
+              <a:t>1/6/2021</a:t>
             </a:fld>
             <a:endParaRPr lang="en-US"/>
           </a:p>
@@ -29074,7 +29074,7 @@
           <a:p>
             <a:fld id="{5958763E-B898-436D-883D-03711491D54A}" type="datetimeFigureOut">
               <a:rPr lang="en-US" smtClean="0"/>
-              <a:t>1/4/2021</a:t>
+              <a:t>1/6/2021</a:t>
             </a:fld>
             <a:endParaRPr lang="en-US"/>
           </a:p>
@@ -29275,7 +29275,7 @@
           <a:p>
             <a:fld id="{5958763E-B898-436D-883D-03711491D54A}" type="datetimeFigureOut">
               <a:rPr lang="en-US" smtClean="0"/>
-              <a:t>1/4/2021</a:t>
+              <a:t>1/6/2021</a:t>
             </a:fld>
             <a:endParaRPr lang="en-US"/>
           </a:p>
@@ -29536,7 +29536,7 @@
           <a:p>
             <a:fld id="{5958763E-B898-436D-883D-03711491D54A}" type="datetimeFigureOut">
               <a:rPr lang="en-US" smtClean="0"/>
-              <a:t>1/4/2021</a:t>
+              <a:t>1/6/2021</a:t>
             </a:fld>
             <a:endParaRPr lang="en-US"/>
           </a:p>
@@ -30044,7 +30044,7 @@
           <a:p>
             <a:fld id="{5958763E-B898-436D-883D-03711491D54A}" type="datetimeFigureOut">
               <a:rPr lang="en-US" smtClean="0"/>
-              <a:t>1/4/2021</a:t>
+              <a:t>1/6/2021</a:t>
             </a:fld>
             <a:endParaRPr lang="en-US"/>
           </a:p>
@@ -30523,7 +30523,7 @@
           <a:p>
             <a:fld id="{5958763E-B898-436D-883D-03711491D54A}" type="datetimeFigureOut">
               <a:rPr lang="en-US" smtClean="0"/>
-              <a:t>1/4/2021</a:t>
+              <a:t>1/6/2021</a:t>
             </a:fld>
             <a:endParaRPr lang="en-US"/>
           </a:p>
@@ -31342,7 +31342,7 @@
           <a:p>
             <a:fld id="{5958763E-B898-436D-883D-03711491D54A}" type="datetimeFigureOut">
               <a:rPr lang="en-US" smtClean="0"/>
-              <a:t>1/4/2021</a:t>
+              <a:t>1/6/2021</a:t>
             </a:fld>
             <a:endParaRPr lang="en-US"/>
           </a:p>
@@ -31543,7 +31543,7 @@
           <a:p>
             <a:fld id="{5958763E-B898-436D-883D-03711491D54A}" type="datetimeFigureOut">
               <a:rPr lang="en-US" smtClean="0"/>
-              <a:t>1/4/2021</a:t>
+              <a:t>1/6/2021</a:t>
             </a:fld>
             <a:endParaRPr lang="en-US"/>
           </a:p>
@@ -31878,7 +31878,7 @@
           <a:p>
             <a:fld id="{5958763E-B898-436D-883D-03711491D54A}" type="datetimeFigureOut">
               <a:rPr lang="en-US" smtClean="0"/>
-              <a:t>1/4/2021</a:t>
+              <a:t>1/6/2021</a:t>
             </a:fld>
             <a:endParaRPr lang="en-US"/>
           </a:p>
@@ -32108,7 +32108,7 @@
           <a:p>
             <a:fld id="{5958763E-B898-436D-883D-03711491D54A}" type="datetimeFigureOut">
               <a:rPr lang="en-US" smtClean="0"/>
-              <a:t>1/4/2021</a:t>
+              <a:t>1/6/2021</a:t>
             </a:fld>
             <a:endParaRPr lang="en-US"/>
           </a:p>
@@ -32352,7 +32352,7 @@
           <a:p>
             <a:fld id="{5958763E-B898-436D-883D-03711491D54A}" type="datetimeFigureOut">
               <a:rPr lang="en-US" smtClean="0"/>
-              <a:t>1/4/2021</a:t>
+              <a:t>1/6/2021</a:t>
             </a:fld>
             <a:endParaRPr lang="en-US"/>
           </a:p>
@@ -32900,7 +32900,7 @@
         <p:spPr>
           <a:xfrm>
             <a:off x="381000" y="3429000"/>
-            <a:ext cx="4809330" cy="553998"/>
+            <a:ext cx="5562741" cy="553998"/>
           </a:xfrm>
         </p:spPr>
         <p:txBody>
@@ -32909,8 +32909,13 @@
           <a:p>
             <a:r>
               <a:rPr lang="en-US" dirty="0"/>
-              <a:t>Hy-Tech Club: Python</a:t>
+              <a:t>Hy-Tech Club</a:t>
             </a:r>
+            <a:r>
+              <a:rPr lang="en-US"/>
+              <a:t>: Python 201</a:t>
+            </a:r>
+            <a:endParaRPr lang="en-US" dirty="0"/>
           </a:p>
         </p:txBody>
       </p:sp>

</xml_diff>